<commit_message>
add code and fix pres
</commit_message>
<xml_diff>
--- a/5/лямбдаВыражения.pptx
+++ b/5/лямбдаВыражения.pptx
@@ -5,7 +5,7 @@
     <p:sldMasterId id="2147483659" r:id="rId1"/>
   </p:sldMasterIdLst>
   <p:notesMasterIdLst>
-    <p:notesMasterId r:id="rId20"/>
+    <p:notesMasterId r:id="rId23"/>
   </p:notesMasterIdLst>
   <p:sldIdLst>
     <p:sldId id="256" r:id="rId2"/>
@@ -23,26 +23,29 @@
     <p:sldId id="268" r:id="rId14"/>
     <p:sldId id="269" r:id="rId15"/>
     <p:sldId id="270" r:id="rId16"/>
-    <p:sldId id="271" r:id="rId17"/>
-    <p:sldId id="272" r:id="rId18"/>
-    <p:sldId id="273" r:id="rId19"/>
+    <p:sldId id="274" r:id="rId17"/>
+    <p:sldId id="271" r:id="rId18"/>
+    <p:sldId id="272" r:id="rId19"/>
+    <p:sldId id="275" r:id="rId20"/>
+    <p:sldId id="276" r:id="rId21"/>
+    <p:sldId id="273" r:id="rId22"/>
   </p:sldIdLst>
   <p:sldSz cx="9144000" cy="5143500" type="screen16x9"/>
   <p:notesSz cx="6858000" cy="9144000"/>
   <p:embeddedFontLst>
     <p:embeddedFont>
       <p:font typeface="Roboto" panose="02000000000000000000" pitchFamily="2" charset="0"/>
-      <p:regular r:id="rId21"/>
-      <p:bold r:id="rId22"/>
-      <p:italic r:id="rId23"/>
-      <p:boldItalic r:id="rId24"/>
+      <p:regular r:id="rId24"/>
+      <p:bold r:id="rId25"/>
+      <p:italic r:id="rId26"/>
+      <p:boldItalic r:id="rId27"/>
     </p:embeddedFont>
     <p:embeddedFont>
       <p:font typeface="Roboto Mono" panose="00000009000000000000" pitchFamily="49" charset="0"/>
-      <p:regular r:id="rId25"/>
-      <p:bold r:id="rId26"/>
-      <p:italic r:id="rId27"/>
-      <p:boldItalic r:id="rId28"/>
+      <p:regular r:id="rId28"/>
+      <p:bold r:id="rId29"/>
+      <p:italic r:id="rId30"/>
+      <p:boldItalic r:id="rId31"/>
     </p:embeddedFont>
   </p:embeddedFontLst>
   <p:defaultTextStyle>
@@ -8887,6 +8890,178 @@
   <p:cSld>
     <p:spTree>
       <p:nvGrpSpPr>
+        <p:cNvPr id="1" name=""/>
+        <p:cNvGrpSpPr/>
+        <p:nvPr/>
+      </p:nvGrpSpPr>
+      <p:grpSpPr>
+        <a:xfrm>
+          <a:off x="0" y="0"/>
+          <a:ext cx="0" cy="0"/>
+          <a:chOff x="0" y="0"/>
+          <a:chExt cx="0" cy="0"/>
+        </a:xfrm>
+      </p:grpSpPr>
+      <p:pic>
+        <p:nvPicPr>
+          <p:cNvPr id="6" name="Google Shape;155;p27">
+            <a:extLst>
+              <a:ext uri="{FF2B5EF4-FFF2-40B4-BE49-F238E27FC236}">
+                <a16:creationId xmlns:a16="http://schemas.microsoft.com/office/drawing/2014/main" id="{77662D9B-97B6-7505-BC66-E96D1B995F1E}"/>
+              </a:ext>
+            </a:extLst>
+          </p:cNvPr>
+          <p:cNvPicPr preferRelativeResize="0"/>
+          <p:nvPr/>
+        </p:nvPicPr>
+        <p:blipFill>
+          <a:blip r:embed="rId2">
+            <a:alphaModFix/>
+          </a:blip>
+          <a:stretch>
+            <a:fillRect/>
+          </a:stretch>
+        </p:blipFill>
+        <p:spPr>
+          <a:xfrm>
+            <a:off x="261257" y="1306767"/>
+            <a:ext cx="3843094" cy="2529963"/>
+          </a:xfrm>
+          <a:prstGeom prst="rect">
+            <a:avLst/>
+          </a:prstGeom>
+          <a:noFill/>
+          <a:ln>
+            <a:noFill/>
+          </a:ln>
+        </p:spPr>
+      </p:pic>
+      <p:pic>
+        <p:nvPicPr>
+          <p:cNvPr id="5" name="Рисунок 4">
+            <a:extLst>
+              <a:ext uri="{FF2B5EF4-FFF2-40B4-BE49-F238E27FC236}">
+                <a16:creationId xmlns:a16="http://schemas.microsoft.com/office/drawing/2014/main" id="{13917317-21CE-8E17-3CBA-82FE1EA39C0F}"/>
+              </a:ext>
+            </a:extLst>
+          </p:cNvPr>
+          <p:cNvPicPr>
+            <a:picLocks noChangeAspect="1"/>
+          </p:cNvPicPr>
+          <p:nvPr/>
+        </p:nvPicPr>
+        <p:blipFill>
+          <a:blip r:embed="rId3"/>
+          <a:stretch>
+            <a:fillRect/>
+          </a:stretch>
+        </p:blipFill>
+        <p:spPr>
+          <a:xfrm>
+            <a:off x="4441241" y="1457105"/>
+            <a:ext cx="4549261" cy="2229289"/>
+          </a:xfrm>
+          <a:prstGeom prst="rect">
+            <a:avLst/>
+          </a:prstGeom>
+        </p:spPr>
+      </p:pic>
+      <p:sp>
+        <p:nvSpPr>
+          <p:cNvPr id="7" name="TextBox 6">
+            <a:extLst>
+              <a:ext uri="{FF2B5EF4-FFF2-40B4-BE49-F238E27FC236}">
+                <a16:creationId xmlns:a16="http://schemas.microsoft.com/office/drawing/2014/main" id="{4A22FD76-62DF-55EF-0365-3E8DCB45F084}"/>
+              </a:ext>
+            </a:extLst>
+          </p:cNvPr>
+          <p:cNvSpPr txBox="1"/>
+          <p:nvPr/>
+        </p:nvSpPr>
+        <p:spPr>
+          <a:xfrm>
+            <a:off x="261257" y="391886"/>
+            <a:ext cx="8376557" cy="307777"/>
+          </a:xfrm>
+          <a:prstGeom prst="rect">
+            <a:avLst/>
+          </a:prstGeom>
+          <a:noFill/>
+        </p:spPr>
+        <p:txBody>
+          <a:bodyPr wrap="square" rtlCol="0">
+            <a:spAutoFit/>
+          </a:bodyPr>
+          <a:lstStyle/>
+          <a:p>
+            <a:r>
+              <a:rPr lang="ru-RU" dirty="0"/>
+              <a:t>Замыкание фиксирует переменные </a:t>
+            </a:r>
+            <a:r>
+              <a:rPr lang="ru-RU" b="1" dirty="0"/>
+              <a:t>в момент создания</a:t>
+            </a:r>
+            <a:r>
+              <a:rPr lang="ru-RU" dirty="0"/>
+              <a:t> (а не в момент вызова).</a:t>
+            </a:r>
+          </a:p>
+        </p:txBody>
+      </p:sp>
+      <p:sp>
+        <p:nvSpPr>
+          <p:cNvPr id="8" name="TextBox 7">
+            <a:extLst>
+              <a:ext uri="{FF2B5EF4-FFF2-40B4-BE49-F238E27FC236}">
+                <a16:creationId xmlns:a16="http://schemas.microsoft.com/office/drawing/2014/main" id="{9499CF82-3F46-93F7-5AF2-457BDB6A5744}"/>
+              </a:ext>
+            </a:extLst>
+          </p:cNvPr>
+          <p:cNvSpPr txBox="1"/>
+          <p:nvPr/>
+        </p:nvSpPr>
+        <p:spPr>
+          <a:xfrm>
+            <a:off x="4776107" y="3992336"/>
+            <a:ext cx="2408464" cy="307777"/>
+          </a:xfrm>
+          <a:prstGeom prst="rect">
+            <a:avLst/>
+          </a:prstGeom>
+          <a:noFill/>
+        </p:spPr>
+        <p:txBody>
+          <a:bodyPr wrap="square" rtlCol="0">
+            <a:spAutoFit/>
+          </a:bodyPr>
+          <a:lstStyle/>
+          <a:p>
+            <a:r>
+              <a:rPr lang="ru-RU" dirty="0"/>
+              <a:t>Вывод: 5</a:t>
+            </a:r>
+          </a:p>
+        </p:txBody>
+      </p:sp>
+    </p:spTree>
+    <p:extLst>
+      <p:ext uri="{BB962C8B-B14F-4D97-AF65-F5344CB8AC3E}">
+        <p14:creationId xmlns:p14="http://schemas.microsoft.com/office/powerpoint/2010/main" val="3751043465"/>
+      </p:ext>
+    </p:extLst>
+  </p:cSld>
+  <p:clrMapOvr>
+    <a:masterClrMapping/>
+  </p:clrMapOvr>
+</p:sld>
+</file>
+
+<file path=ppt/slides/slide17.xml><?xml version="1.0" encoding="utf-8"?>
+<p:sld xmlns:a="http://schemas.openxmlformats.org/drawingml/2006/main" xmlns:r="http://schemas.openxmlformats.org/officeDocument/2006/relationships" xmlns:p="http://schemas.openxmlformats.org/presentationml/2006/main">
+  <p:cSld>
+    <p:spTree>
+      <p:nvGrpSpPr>
         <p:cNvPr id="1" name="Shape 160"/>
         <p:cNvGrpSpPr/>
         <p:nvPr/>
@@ -8976,7 +9151,7 @@
 </p:sld>
 </file>
 
-<file path=ppt/slides/slide17.xml><?xml version="1.0" encoding="utf-8"?>
+<file path=ppt/slides/slide18.xml><?xml version="1.0" encoding="utf-8"?>
 <p:sld xmlns:a="http://schemas.openxmlformats.org/drawingml/2006/main" xmlns:r="http://schemas.openxmlformats.org/officeDocument/2006/relationships" xmlns:p="http://schemas.openxmlformats.org/presentationml/2006/main">
   <p:cSld>
     <p:spTree>
@@ -9314,7 +9489,717 @@
 </p:sld>
 </file>
 
-<file path=ppt/slides/slide18.xml><?xml version="1.0" encoding="utf-8"?>
+<file path=ppt/slides/slide19.xml><?xml version="1.0" encoding="utf-8"?>
+<p:sld xmlns:a="http://schemas.openxmlformats.org/drawingml/2006/main" xmlns:r="http://schemas.openxmlformats.org/officeDocument/2006/relationships" xmlns:p="http://schemas.openxmlformats.org/presentationml/2006/main">
+  <p:cSld>
+    <p:spTree>
+      <p:nvGrpSpPr>
+        <p:cNvPr id="1" name=""/>
+        <p:cNvGrpSpPr/>
+        <p:nvPr/>
+      </p:nvGrpSpPr>
+      <p:grpSpPr>
+        <a:xfrm>
+          <a:off x="0" y="0"/>
+          <a:ext cx="0" cy="0"/>
+          <a:chOff x="0" y="0"/>
+          <a:chExt cx="0" cy="0"/>
+        </a:xfrm>
+      </p:grpSpPr>
+      <p:sp>
+        <p:nvSpPr>
+          <p:cNvPr id="2" name="Заголовок 1">
+            <a:extLst>
+              <a:ext uri="{FF2B5EF4-FFF2-40B4-BE49-F238E27FC236}">
+                <a16:creationId xmlns:a16="http://schemas.microsoft.com/office/drawing/2014/main" id="{4C0C8355-3EF4-AA97-D18C-E0CE512303D7}"/>
+              </a:ext>
+            </a:extLst>
+          </p:cNvPr>
+          <p:cNvSpPr>
+            <a:spLocks noGrp="1"/>
+          </p:cNvSpPr>
+          <p:nvPr>
+            <p:ph type="title"/>
+          </p:nvPr>
+        </p:nvSpPr>
+        <p:spPr/>
+        <p:txBody>
+          <a:bodyPr>
+            <a:normAutofit fontScale="90000"/>
+          </a:bodyPr>
+          <a:lstStyle/>
+          <a:p>
+            <a:r>
+              <a:rPr lang="ru-RU" b="1" dirty="0" err="1"/>
+              <a:t>Каррирование</a:t>
+            </a:r>
+            <a:r>
+              <a:rPr lang="ru-RU" b="1" dirty="0"/>
+              <a:t> </a:t>
+            </a:r>
+            <a:endParaRPr lang="ru-RU" dirty="0"/>
+          </a:p>
+        </p:txBody>
+      </p:sp>
+      <p:sp>
+        <p:nvSpPr>
+          <p:cNvPr id="3" name="Текст 2">
+            <a:extLst>
+              <a:ext uri="{FF2B5EF4-FFF2-40B4-BE49-F238E27FC236}">
+                <a16:creationId xmlns:a16="http://schemas.microsoft.com/office/drawing/2014/main" id="{039A686A-E375-65A2-9C3A-002ACB78A3CC}"/>
+              </a:ext>
+            </a:extLst>
+          </p:cNvPr>
+          <p:cNvSpPr>
+            <a:spLocks noGrp="1"/>
+          </p:cNvSpPr>
+          <p:nvPr>
+            <p:ph type="body" idx="1"/>
+          </p:nvPr>
+        </p:nvSpPr>
+        <p:spPr>
+          <a:xfrm>
+            <a:off x="311700" y="1152475"/>
+            <a:ext cx="8520600" cy="439561"/>
+          </a:xfrm>
+        </p:spPr>
+        <p:txBody>
+          <a:bodyPr>
+            <a:normAutofit fontScale="92500" lnSpcReduction="20000"/>
+          </a:bodyPr>
+          <a:lstStyle/>
+          <a:p>
+            <a:pPr marL="114300" indent="0">
+              <a:buNone/>
+            </a:pPr>
+            <a:r>
+              <a:rPr lang="ru-RU" dirty="0"/>
+              <a:t>сохранение аргументов для дальнейшего использования</a:t>
+            </a:r>
+          </a:p>
+        </p:txBody>
+      </p:sp>
+      <p:pic>
+        <p:nvPicPr>
+          <p:cNvPr id="1026" name="Picture 2">
+            <a:extLst>
+              <a:ext uri="{FF2B5EF4-FFF2-40B4-BE49-F238E27FC236}">
+                <a16:creationId xmlns:a16="http://schemas.microsoft.com/office/drawing/2014/main" id="{44C8CF4F-5CA2-D2D5-7BB4-557D17F2B774}"/>
+              </a:ext>
+            </a:extLst>
+          </p:cNvPr>
+          <p:cNvPicPr>
+            <a:picLocks noChangeAspect="1" noChangeArrowheads="1"/>
+          </p:cNvPicPr>
+          <p:nvPr/>
+        </p:nvPicPr>
+        <p:blipFill>
+          <a:blip r:embed="rId2">
+            <a:extLst>
+              <a:ext uri="{28A0092B-C50C-407E-A947-70E740481C1C}">
+                <a14:useLocalDpi xmlns:a14="http://schemas.microsoft.com/office/drawing/2010/main" val="0"/>
+              </a:ext>
+            </a:extLst>
+          </a:blip>
+          <a:srcRect/>
+          <a:stretch>
+            <a:fillRect/>
+          </a:stretch>
+        </p:blipFill>
+        <p:spPr bwMode="auto">
+          <a:xfrm>
+            <a:off x="481013" y="1649236"/>
+            <a:ext cx="6696075" cy="1362075"/>
+          </a:xfrm>
+          <a:prstGeom prst="rect">
+            <a:avLst/>
+          </a:prstGeom>
+          <a:noFill/>
+          <a:extLst>
+            <a:ext uri="{909E8E84-426E-40DD-AFC4-6F175D3DCCD1}">
+              <a14:hiddenFill xmlns:a14="http://schemas.microsoft.com/office/drawing/2010/main">
+                <a:solidFill>
+                  <a:srgbClr val="FFFFFF"/>
+                </a:solidFill>
+              </a14:hiddenFill>
+            </a:ext>
+          </a:extLst>
+        </p:spPr>
+      </p:pic>
+    </p:spTree>
+    <p:extLst>
+      <p:ext uri="{BB962C8B-B14F-4D97-AF65-F5344CB8AC3E}">
+        <p14:creationId xmlns:p14="http://schemas.microsoft.com/office/powerpoint/2010/main" val="309263940"/>
+      </p:ext>
+    </p:extLst>
+  </p:cSld>
+  <p:clrMapOvr>
+    <a:masterClrMapping/>
+  </p:clrMapOvr>
+</p:sld>
+</file>
+
+<file path=ppt/slides/slide2.xml><?xml version="1.0" encoding="utf-8"?>
+<p:sld xmlns:a="http://schemas.openxmlformats.org/drawingml/2006/main" xmlns:r="http://schemas.openxmlformats.org/officeDocument/2006/relationships" xmlns:p="http://schemas.openxmlformats.org/presentationml/2006/main">
+  <p:cSld>
+    <p:spTree>
+      <p:nvGrpSpPr>
+        <p:cNvPr id="1" name="Shape 59"/>
+        <p:cNvGrpSpPr/>
+        <p:nvPr/>
+      </p:nvGrpSpPr>
+      <p:grpSpPr>
+        <a:xfrm>
+          <a:off x="0" y="0"/>
+          <a:ext cx="0" cy="0"/>
+          <a:chOff x="0" y="0"/>
+          <a:chExt cx="0" cy="0"/>
+        </a:xfrm>
+      </p:grpSpPr>
+      <p:sp>
+        <p:nvSpPr>
+          <p:cNvPr id="60" name="Google Shape;60;p14"/>
+          <p:cNvSpPr txBox="1">
+            <a:spLocks noGrp="1"/>
+          </p:cNvSpPr>
+          <p:nvPr>
+            <p:ph type="title"/>
+          </p:nvPr>
+        </p:nvSpPr>
+        <p:spPr>
+          <a:xfrm>
+            <a:off x="223250" y="129100"/>
+            <a:ext cx="8520600" cy="572700"/>
+          </a:xfrm>
+          <a:prstGeom prst="rect">
+            <a:avLst/>
+          </a:prstGeom>
+        </p:spPr>
+        <p:txBody>
+          <a:bodyPr spcFirstLastPara="1" wrap="square" lIns="91425" tIns="91425" rIns="91425" bIns="91425" anchor="t" anchorCtr="0">
+            <a:normAutofit fontScale="90000"/>
+          </a:bodyPr>
+          <a:lstStyle/>
+          <a:p>
+            <a:pPr marL="0" lvl="0" indent="0" algn="l" rtl="0">
+              <a:spcBef>
+                <a:spcPts val="0"/>
+              </a:spcBef>
+              <a:spcAft>
+                <a:spcPts val="0"/>
+              </a:spcAft>
+              <a:buNone/>
+            </a:pPr>
+            <a:r>
+              <a:rPr lang="ru"/>
+              <a:t>Зачем нужны лямбда-выражения ?</a:t>
+            </a:r>
+            <a:endParaRPr/>
+          </a:p>
+        </p:txBody>
+      </p:sp>
+      <p:sp>
+        <p:nvSpPr>
+          <p:cNvPr id="61" name="Google Shape;61;p14"/>
+          <p:cNvSpPr txBox="1">
+            <a:spLocks noGrp="1"/>
+          </p:cNvSpPr>
+          <p:nvPr>
+            <p:ph type="body" idx="1"/>
+          </p:nvPr>
+        </p:nvSpPr>
+        <p:spPr>
+          <a:xfrm>
+            <a:off x="311700" y="1457550"/>
+            <a:ext cx="3166200" cy="3416400"/>
+          </a:xfrm>
+          <a:prstGeom prst="rect">
+            <a:avLst/>
+          </a:prstGeom>
+          <a:ln w="19050" cap="flat" cmpd="sng">
+            <a:solidFill>
+              <a:srgbClr val="E06666"/>
+            </a:solidFill>
+            <a:prstDash val="solid"/>
+            <a:round/>
+            <a:headEnd type="none" w="sm" len="sm"/>
+            <a:tailEnd type="none" w="sm" len="sm"/>
+          </a:ln>
+        </p:spPr>
+        <p:txBody>
+          <a:bodyPr spcFirstLastPara="1" wrap="square" lIns="91425" tIns="91425" rIns="91425" bIns="91425" anchor="t" anchorCtr="0">
+            <a:normAutofit fontScale="85000" lnSpcReduction="10000"/>
+          </a:bodyPr>
+          <a:lstStyle/>
+          <a:p>
+            <a:pPr marL="0" lvl="0" indent="0" algn="l" rtl="0">
+              <a:spcBef>
+                <a:spcPts val="0"/>
+              </a:spcBef>
+              <a:spcAft>
+                <a:spcPts val="0"/>
+              </a:spcAft>
+              <a:buNone/>
+            </a:pPr>
+            <a:r>
+              <a:rPr lang="ru" b="1"/>
+              <a:t>До</a:t>
+            </a:r>
+            <a:endParaRPr b="1"/>
+          </a:p>
+          <a:p>
+            <a:pPr marL="0" lvl="0" indent="0" algn="l" rtl="0">
+              <a:spcBef>
+                <a:spcPts val="1200"/>
+              </a:spcBef>
+              <a:spcAft>
+                <a:spcPts val="0"/>
+              </a:spcAft>
+              <a:buClr>
+                <a:schemeClr val="dk1"/>
+              </a:buClr>
+              <a:buSzPct val="61111"/>
+              <a:buFont typeface="Arial"/>
+              <a:buNone/>
+            </a:pPr>
+            <a:r>
+              <a:rPr lang="ru"/>
+              <a:t>new Thread(new Runnable() {</a:t>
+            </a:r>
+            <a:endParaRPr/>
+          </a:p>
+          <a:p>
+            <a:pPr marL="0" lvl="0" indent="0" algn="l" rtl="0">
+              <a:spcBef>
+                <a:spcPts val="1200"/>
+              </a:spcBef>
+              <a:spcAft>
+                <a:spcPts val="0"/>
+              </a:spcAft>
+              <a:buClr>
+                <a:schemeClr val="dk1"/>
+              </a:buClr>
+              <a:buSzPct val="61111"/>
+              <a:buFont typeface="Arial"/>
+              <a:buNone/>
+            </a:pPr>
+            <a:r>
+              <a:rPr lang="ru"/>
+              <a:t>    @Override</a:t>
+            </a:r>
+            <a:endParaRPr/>
+          </a:p>
+          <a:p>
+            <a:pPr marL="0" lvl="0" indent="0" algn="l" rtl="0">
+              <a:spcBef>
+                <a:spcPts val="1200"/>
+              </a:spcBef>
+              <a:spcAft>
+                <a:spcPts val="0"/>
+              </a:spcAft>
+              <a:buClr>
+                <a:schemeClr val="dk1"/>
+              </a:buClr>
+              <a:buSzPct val="61111"/>
+              <a:buFont typeface="Arial"/>
+              <a:buNone/>
+            </a:pPr>
+            <a:r>
+              <a:rPr lang="ru"/>
+              <a:t>    public void run() {</a:t>
+            </a:r>
+            <a:endParaRPr/>
+          </a:p>
+          <a:p>
+            <a:pPr marL="0" lvl="0" indent="0" algn="l" rtl="0">
+              <a:spcBef>
+                <a:spcPts val="1200"/>
+              </a:spcBef>
+              <a:spcAft>
+                <a:spcPts val="0"/>
+              </a:spcAft>
+              <a:buClr>
+                <a:schemeClr val="dk1"/>
+              </a:buClr>
+              <a:buSzPct val="61111"/>
+              <a:buFont typeface="Arial"/>
+              <a:buNone/>
+            </a:pPr>
+            <a:r>
+              <a:rPr lang="ru"/>
+              <a:t>        System.out.println("Привет, мир!");</a:t>
+            </a:r>
+            <a:endParaRPr/>
+          </a:p>
+          <a:p>
+            <a:pPr marL="0" lvl="0" indent="0" algn="l" rtl="0">
+              <a:spcBef>
+                <a:spcPts val="1200"/>
+              </a:spcBef>
+              <a:spcAft>
+                <a:spcPts val="0"/>
+              </a:spcAft>
+              <a:buClr>
+                <a:schemeClr val="dk1"/>
+              </a:buClr>
+              <a:buSzPct val="61111"/>
+              <a:buFont typeface="Arial"/>
+              <a:buNone/>
+            </a:pPr>
+            <a:r>
+              <a:rPr lang="ru"/>
+              <a:t>    }</a:t>
+            </a:r>
+            <a:endParaRPr/>
+          </a:p>
+          <a:p>
+            <a:pPr marL="0" lvl="0" indent="0" algn="l" rtl="0">
+              <a:spcBef>
+                <a:spcPts val="1200"/>
+              </a:spcBef>
+              <a:spcAft>
+                <a:spcPts val="1200"/>
+              </a:spcAft>
+              <a:buClr>
+                <a:schemeClr val="dk1"/>
+              </a:buClr>
+              <a:buSzPct val="61111"/>
+              <a:buFont typeface="Arial"/>
+              <a:buNone/>
+            </a:pPr>
+            <a:r>
+              <a:rPr lang="ru"/>
+              <a:t>}).start();</a:t>
+            </a:r>
+            <a:endParaRPr/>
+          </a:p>
+        </p:txBody>
+      </p:sp>
+      <p:sp>
+        <p:nvSpPr>
+          <p:cNvPr id="62" name="Google Shape;62;p14"/>
+          <p:cNvSpPr txBox="1">
+            <a:spLocks noGrp="1"/>
+          </p:cNvSpPr>
+          <p:nvPr>
+            <p:ph type="body" idx="1"/>
+          </p:nvPr>
+        </p:nvSpPr>
+        <p:spPr>
+          <a:xfrm>
+            <a:off x="5666100" y="1457550"/>
+            <a:ext cx="3166200" cy="3416400"/>
+          </a:xfrm>
+          <a:prstGeom prst="rect">
+            <a:avLst/>
+          </a:prstGeom>
+          <a:ln w="19050" cap="flat" cmpd="sng">
+            <a:solidFill>
+              <a:srgbClr val="6AA84F"/>
+            </a:solidFill>
+            <a:prstDash val="solid"/>
+            <a:round/>
+            <a:headEnd type="none" w="sm" len="sm"/>
+            <a:tailEnd type="none" w="sm" len="sm"/>
+          </a:ln>
+        </p:spPr>
+        <p:txBody>
+          <a:bodyPr spcFirstLastPara="1" wrap="square" lIns="91425" tIns="91425" rIns="91425" bIns="91425" anchor="t" anchorCtr="0">
+            <a:normAutofit/>
+          </a:bodyPr>
+          <a:lstStyle/>
+          <a:p>
+            <a:pPr marL="0" lvl="0" indent="0" algn="l" rtl="0">
+              <a:spcBef>
+                <a:spcPts val="0"/>
+              </a:spcBef>
+              <a:spcAft>
+                <a:spcPts val="0"/>
+              </a:spcAft>
+              <a:buNone/>
+            </a:pPr>
+            <a:r>
+              <a:rPr lang="ru" b="1"/>
+              <a:t>После</a:t>
+            </a:r>
+            <a:endParaRPr b="1"/>
+          </a:p>
+          <a:p>
+            <a:pPr marL="0" lvl="0" indent="0" algn="l" rtl="0">
+              <a:spcBef>
+                <a:spcPts val="1200"/>
+              </a:spcBef>
+              <a:spcAft>
+                <a:spcPts val="0"/>
+              </a:spcAft>
+              <a:buNone/>
+            </a:pPr>
+            <a:r>
+              <a:rPr lang="ru"/>
+              <a:t>new Thread(() -&gt; System.out.println("Привет, мир!")).start();</a:t>
+            </a:r>
+            <a:endParaRPr/>
+          </a:p>
+          <a:p>
+            <a:pPr marL="0" lvl="0" indent="0" algn="l" rtl="0">
+              <a:spcBef>
+                <a:spcPts val="1200"/>
+              </a:spcBef>
+              <a:spcAft>
+                <a:spcPts val="1200"/>
+              </a:spcAft>
+              <a:buNone/>
+            </a:pPr>
+            <a:endParaRPr/>
+          </a:p>
+        </p:txBody>
+      </p:sp>
+      <p:sp>
+        <p:nvSpPr>
+          <p:cNvPr id="63" name="Google Shape;63;p14"/>
+          <p:cNvSpPr txBox="1"/>
+          <p:nvPr/>
+        </p:nvSpPr>
+        <p:spPr>
+          <a:xfrm>
+            <a:off x="223250" y="701800"/>
+            <a:ext cx="8520600" cy="439800"/>
+          </a:xfrm>
+          <a:prstGeom prst="rect">
+            <a:avLst/>
+          </a:prstGeom>
+          <a:noFill/>
+          <a:ln>
+            <a:noFill/>
+          </a:ln>
+        </p:spPr>
+        <p:txBody>
+          <a:bodyPr spcFirstLastPara="1" wrap="square" lIns="91425" tIns="91425" rIns="91425" bIns="91425" anchor="t" anchorCtr="0">
+            <a:noAutofit/>
+          </a:bodyPr>
+          <a:lstStyle/>
+          <a:p>
+            <a:pPr marL="0" lvl="0" indent="0" algn="l" rtl="0">
+              <a:spcBef>
+                <a:spcPts val="0"/>
+              </a:spcBef>
+              <a:spcAft>
+                <a:spcPts val="0"/>
+              </a:spcAft>
+              <a:buNone/>
+            </a:pPr>
+            <a:r>
+              <a:rPr lang="ru">
+                <a:solidFill>
+                  <a:srgbClr val="2F2F2F"/>
+                </a:solidFill>
+              </a:rPr>
+              <a:t>Лямбды помогают создавать более лаконичный код. Они представляют собой сокращенную запись анонимного класса</a:t>
+            </a:r>
+            <a:endParaRPr sz="2000">
+              <a:solidFill>
+                <a:schemeClr val="dk2"/>
+              </a:solidFill>
+            </a:endParaRPr>
+          </a:p>
+        </p:txBody>
+      </p:sp>
+      <p:sp>
+        <p:nvSpPr>
+          <p:cNvPr id="64" name="Google Shape;64;p14"/>
+          <p:cNvSpPr/>
+          <p:nvPr/>
+        </p:nvSpPr>
+        <p:spPr>
+          <a:xfrm>
+            <a:off x="3640825" y="2713875"/>
+            <a:ext cx="1810500" cy="328500"/>
+          </a:xfrm>
+          <a:prstGeom prst="rightArrow">
+            <a:avLst>
+              <a:gd name="adj1" fmla="val 50000"/>
+              <a:gd name="adj2" fmla="val 50000"/>
+            </a:avLst>
+          </a:prstGeom>
+          <a:gradFill>
+            <a:gsLst>
+              <a:gs pos="0">
+                <a:srgbClr val="DB0000"/>
+              </a:gs>
+              <a:gs pos="28000">
+                <a:srgbClr val="FF0000"/>
+              </a:gs>
+              <a:gs pos="58000">
+                <a:srgbClr val="6AA84F"/>
+              </a:gs>
+              <a:gs pos="100000">
+                <a:srgbClr val="6AA84F"/>
+              </a:gs>
+            </a:gsLst>
+            <a:lin ang="0" scaled="0"/>
+          </a:gradFill>
+          <a:ln w="9525" cap="flat" cmpd="sng">
+            <a:solidFill>
+              <a:schemeClr val="dk2"/>
+            </a:solidFill>
+            <a:prstDash val="solid"/>
+            <a:round/>
+            <a:headEnd type="none" w="sm" len="sm"/>
+            <a:tailEnd type="none" w="sm" len="sm"/>
+          </a:ln>
+        </p:spPr>
+        <p:txBody>
+          <a:bodyPr spcFirstLastPara="1" wrap="square" lIns="91425" tIns="91425" rIns="91425" bIns="91425" anchor="ctr" anchorCtr="0">
+            <a:noAutofit/>
+          </a:bodyPr>
+          <a:lstStyle/>
+          <a:p>
+            <a:pPr marL="0" lvl="0" indent="0" algn="ctr" rtl="0">
+              <a:spcBef>
+                <a:spcPts val="0"/>
+              </a:spcBef>
+              <a:spcAft>
+                <a:spcPts val="0"/>
+              </a:spcAft>
+              <a:buNone/>
+            </a:pPr>
+            <a:endParaRPr/>
+          </a:p>
+        </p:txBody>
+      </p:sp>
+    </p:spTree>
+  </p:cSld>
+  <p:clrMapOvr>
+    <a:masterClrMapping/>
+  </p:clrMapOvr>
+</p:sld>
+</file>
+
+<file path=ppt/slides/slide20.xml><?xml version="1.0" encoding="utf-8"?>
+<p:sld xmlns:a="http://schemas.openxmlformats.org/drawingml/2006/main" xmlns:r="http://schemas.openxmlformats.org/officeDocument/2006/relationships" xmlns:p="http://schemas.openxmlformats.org/presentationml/2006/main">
+  <p:cSld>
+    <p:spTree>
+      <p:nvGrpSpPr>
+        <p:cNvPr id="1" name=""/>
+        <p:cNvGrpSpPr/>
+        <p:nvPr/>
+      </p:nvGrpSpPr>
+      <p:grpSpPr>
+        <a:xfrm>
+          <a:off x="0" y="0"/>
+          <a:ext cx="0" cy="0"/>
+          <a:chOff x="0" y="0"/>
+          <a:chExt cx="0" cy="0"/>
+        </a:xfrm>
+      </p:grpSpPr>
+      <p:pic>
+        <p:nvPicPr>
+          <p:cNvPr id="2050" name="Picture 2">
+            <a:extLst>
+              <a:ext uri="{FF2B5EF4-FFF2-40B4-BE49-F238E27FC236}">
+                <a16:creationId xmlns:a16="http://schemas.microsoft.com/office/drawing/2014/main" id="{08FB5F12-0198-76F8-8167-616B265BC969}"/>
+              </a:ext>
+            </a:extLst>
+          </p:cNvPr>
+          <p:cNvPicPr>
+            <a:picLocks noChangeAspect="1" noChangeArrowheads="1"/>
+          </p:cNvPicPr>
+          <p:nvPr/>
+        </p:nvPicPr>
+        <p:blipFill>
+          <a:blip r:embed="rId2">
+            <a:extLst>
+              <a:ext uri="{28A0092B-C50C-407E-A947-70E740481C1C}">
+                <a14:useLocalDpi xmlns:a14="http://schemas.microsoft.com/office/drawing/2010/main" val="0"/>
+              </a:ext>
+            </a:extLst>
+          </a:blip>
+          <a:srcRect/>
+          <a:stretch>
+            <a:fillRect/>
+          </a:stretch>
+        </p:blipFill>
+        <p:spPr bwMode="auto">
+          <a:xfrm>
+            <a:off x="664709" y="998085"/>
+            <a:ext cx="5953125" cy="1057275"/>
+          </a:xfrm>
+          <a:prstGeom prst="rect">
+            <a:avLst/>
+          </a:prstGeom>
+          <a:noFill/>
+          <a:extLst>
+            <a:ext uri="{909E8E84-426E-40DD-AFC4-6F175D3DCCD1}">
+              <a14:hiddenFill xmlns:a14="http://schemas.microsoft.com/office/drawing/2010/main">
+                <a:solidFill>
+                  <a:srgbClr val="FFFFFF"/>
+                </a:solidFill>
+              </a14:hiddenFill>
+            </a:ext>
+          </a:extLst>
+        </p:spPr>
+      </p:pic>
+      <p:pic>
+        <p:nvPicPr>
+          <p:cNvPr id="2052" name="Picture 4">
+            <a:extLst>
+              <a:ext uri="{FF2B5EF4-FFF2-40B4-BE49-F238E27FC236}">
+                <a16:creationId xmlns:a16="http://schemas.microsoft.com/office/drawing/2014/main" id="{566051E3-B789-3814-150D-2B4013C7B0EF}"/>
+              </a:ext>
+            </a:extLst>
+          </p:cNvPr>
+          <p:cNvPicPr>
+            <a:picLocks noChangeAspect="1" noChangeArrowheads="1"/>
+          </p:cNvPicPr>
+          <p:nvPr/>
+        </p:nvPicPr>
+        <p:blipFill>
+          <a:blip r:embed="rId3">
+            <a:extLst>
+              <a:ext uri="{28A0092B-C50C-407E-A947-70E740481C1C}">
+                <a14:useLocalDpi xmlns:a14="http://schemas.microsoft.com/office/drawing/2010/main" val="0"/>
+              </a:ext>
+            </a:extLst>
+          </a:blip>
+          <a:srcRect/>
+          <a:stretch>
+            <a:fillRect/>
+          </a:stretch>
+        </p:blipFill>
+        <p:spPr bwMode="auto">
+          <a:xfrm>
+            <a:off x="664709" y="2203677"/>
+            <a:ext cx="7639050" cy="2009775"/>
+          </a:xfrm>
+          <a:prstGeom prst="rect">
+            <a:avLst/>
+          </a:prstGeom>
+          <a:noFill/>
+          <a:extLst>
+            <a:ext uri="{909E8E84-426E-40DD-AFC4-6F175D3DCCD1}">
+              <a14:hiddenFill xmlns:a14="http://schemas.microsoft.com/office/drawing/2010/main">
+                <a:solidFill>
+                  <a:srgbClr val="FFFFFF"/>
+                </a:solidFill>
+              </a14:hiddenFill>
+            </a:ext>
+          </a:extLst>
+        </p:spPr>
+      </p:pic>
+    </p:spTree>
+    <p:extLst>
+      <p:ext uri="{BB962C8B-B14F-4D97-AF65-F5344CB8AC3E}">
+        <p14:creationId xmlns:p14="http://schemas.microsoft.com/office/powerpoint/2010/main" val="819571650"/>
+      </p:ext>
+    </p:extLst>
+  </p:cSld>
+  <p:clrMapOvr>
+    <a:masterClrMapping/>
+  </p:clrMapOvr>
+</p:sld>
+</file>
+
+<file path=ppt/slides/slide21.xml><?xml version="1.0" encoding="utf-8"?>
 <p:sld xmlns:a="http://schemas.openxmlformats.org/drawingml/2006/main" xmlns:r="http://schemas.openxmlformats.org/officeDocument/2006/relationships" xmlns:p="http://schemas.openxmlformats.org/presentationml/2006/main">
   <p:cSld>
     <p:spTree>
@@ -9684,442 +10569,6 @@
                 <a:schemeClr val="dk1"/>
               </a:solidFill>
             </a:endParaRPr>
-          </a:p>
-        </p:txBody>
-      </p:sp>
-    </p:spTree>
-  </p:cSld>
-  <p:clrMapOvr>
-    <a:masterClrMapping/>
-  </p:clrMapOvr>
-</p:sld>
-</file>
-
-<file path=ppt/slides/slide2.xml><?xml version="1.0" encoding="utf-8"?>
-<p:sld xmlns:a="http://schemas.openxmlformats.org/drawingml/2006/main" xmlns:r="http://schemas.openxmlformats.org/officeDocument/2006/relationships" xmlns:p="http://schemas.openxmlformats.org/presentationml/2006/main">
-  <p:cSld>
-    <p:spTree>
-      <p:nvGrpSpPr>
-        <p:cNvPr id="1" name="Shape 59"/>
-        <p:cNvGrpSpPr/>
-        <p:nvPr/>
-      </p:nvGrpSpPr>
-      <p:grpSpPr>
-        <a:xfrm>
-          <a:off x="0" y="0"/>
-          <a:ext cx="0" cy="0"/>
-          <a:chOff x="0" y="0"/>
-          <a:chExt cx="0" cy="0"/>
-        </a:xfrm>
-      </p:grpSpPr>
-      <p:sp>
-        <p:nvSpPr>
-          <p:cNvPr id="60" name="Google Shape;60;p14"/>
-          <p:cNvSpPr txBox="1">
-            <a:spLocks noGrp="1"/>
-          </p:cNvSpPr>
-          <p:nvPr>
-            <p:ph type="title"/>
-          </p:nvPr>
-        </p:nvSpPr>
-        <p:spPr>
-          <a:xfrm>
-            <a:off x="223250" y="129100"/>
-            <a:ext cx="8520600" cy="572700"/>
-          </a:xfrm>
-          <a:prstGeom prst="rect">
-            <a:avLst/>
-          </a:prstGeom>
-        </p:spPr>
-        <p:txBody>
-          <a:bodyPr spcFirstLastPara="1" wrap="square" lIns="91425" tIns="91425" rIns="91425" bIns="91425" anchor="t" anchorCtr="0">
-            <a:normAutofit fontScale="90000"/>
-          </a:bodyPr>
-          <a:lstStyle/>
-          <a:p>
-            <a:pPr marL="0" lvl="0" indent="0" algn="l" rtl="0">
-              <a:spcBef>
-                <a:spcPts val="0"/>
-              </a:spcBef>
-              <a:spcAft>
-                <a:spcPts val="0"/>
-              </a:spcAft>
-              <a:buNone/>
-            </a:pPr>
-            <a:r>
-              <a:rPr lang="ru"/>
-              <a:t>Зачем нужны лямбда-выражения ?</a:t>
-            </a:r>
-            <a:endParaRPr/>
-          </a:p>
-        </p:txBody>
-      </p:sp>
-      <p:sp>
-        <p:nvSpPr>
-          <p:cNvPr id="61" name="Google Shape;61;p14"/>
-          <p:cNvSpPr txBox="1">
-            <a:spLocks noGrp="1"/>
-          </p:cNvSpPr>
-          <p:nvPr>
-            <p:ph type="body" idx="1"/>
-          </p:nvPr>
-        </p:nvSpPr>
-        <p:spPr>
-          <a:xfrm>
-            <a:off x="311700" y="1457550"/>
-            <a:ext cx="3166200" cy="3416400"/>
-          </a:xfrm>
-          <a:prstGeom prst="rect">
-            <a:avLst/>
-          </a:prstGeom>
-          <a:ln w="19050" cap="flat" cmpd="sng">
-            <a:solidFill>
-              <a:srgbClr val="E06666"/>
-            </a:solidFill>
-            <a:prstDash val="solid"/>
-            <a:round/>
-            <a:headEnd type="none" w="sm" len="sm"/>
-            <a:tailEnd type="none" w="sm" len="sm"/>
-          </a:ln>
-        </p:spPr>
-        <p:txBody>
-          <a:bodyPr spcFirstLastPara="1" wrap="square" lIns="91425" tIns="91425" rIns="91425" bIns="91425" anchor="t" anchorCtr="0">
-            <a:normAutofit fontScale="85000" lnSpcReduction="10000"/>
-          </a:bodyPr>
-          <a:lstStyle/>
-          <a:p>
-            <a:pPr marL="0" lvl="0" indent="0" algn="l" rtl="0">
-              <a:spcBef>
-                <a:spcPts val="0"/>
-              </a:spcBef>
-              <a:spcAft>
-                <a:spcPts val="0"/>
-              </a:spcAft>
-              <a:buNone/>
-            </a:pPr>
-            <a:r>
-              <a:rPr lang="ru" b="1"/>
-              <a:t>До</a:t>
-            </a:r>
-            <a:endParaRPr b="1"/>
-          </a:p>
-          <a:p>
-            <a:pPr marL="0" lvl="0" indent="0" algn="l" rtl="0">
-              <a:spcBef>
-                <a:spcPts val="1200"/>
-              </a:spcBef>
-              <a:spcAft>
-                <a:spcPts val="0"/>
-              </a:spcAft>
-              <a:buClr>
-                <a:schemeClr val="dk1"/>
-              </a:buClr>
-              <a:buSzPct val="61111"/>
-              <a:buFont typeface="Arial"/>
-              <a:buNone/>
-            </a:pPr>
-            <a:r>
-              <a:rPr lang="ru"/>
-              <a:t>new Thread(new Runnable() {</a:t>
-            </a:r>
-            <a:endParaRPr/>
-          </a:p>
-          <a:p>
-            <a:pPr marL="0" lvl="0" indent="0" algn="l" rtl="0">
-              <a:spcBef>
-                <a:spcPts val="1200"/>
-              </a:spcBef>
-              <a:spcAft>
-                <a:spcPts val="0"/>
-              </a:spcAft>
-              <a:buClr>
-                <a:schemeClr val="dk1"/>
-              </a:buClr>
-              <a:buSzPct val="61111"/>
-              <a:buFont typeface="Arial"/>
-              <a:buNone/>
-            </a:pPr>
-            <a:r>
-              <a:rPr lang="ru"/>
-              <a:t>    @Override</a:t>
-            </a:r>
-            <a:endParaRPr/>
-          </a:p>
-          <a:p>
-            <a:pPr marL="0" lvl="0" indent="0" algn="l" rtl="0">
-              <a:spcBef>
-                <a:spcPts val="1200"/>
-              </a:spcBef>
-              <a:spcAft>
-                <a:spcPts val="0"/>
-              </a:spcAft>
-              <a:buClr>
-                <a:schemeClr val="dk1"/>
-              </a:buClr>
-              <a:buSzPct val="61111"/>
-              <a:buFont typeface="Arial"/>
-              <a:buNone/>
-            </a:pPr>
-            <a:r>
-              <a:rPr lang="ru"/>
-              <a:t>    public void run() {</a:t>
-            </a:r>
-            <a:endParaRPr/>
-          </a:p>
-          <a:p>
-            <a:pPr marL="0" lvl="0" indent="0" algn="l" rtl="0">
-              <a:spcBef>
-                <a:spcPts val="1200"/>
-              </a:spcBef>
-              <a:spcAft>
-                <a:spcPts val="0"/>
-              </a:spcAft>
-              <a:buClr>
-                <a:schemeClr val="dk1"/>
-              </a:buClr>
-              <a:buSzPct val="61111"/>
-              <a:buFont typeface="Arial"/>
-              <a:buNone/>
-            </a:pPr>
-            <a:r>
-              <a:rPr lang="ru"/>
-              <a:t>        System.out.println("Привет, мир!");</a:t>
-            </a:r>
-            <a:endParaRPr/>
-          </a:p>
-          <a:p>
-            <a:pPr marL="0" lvl="0" indent="0" algn="l" rtl="0">
-              <a:spcBef>
-                <a:spcPts val="1200"/>
-              </a:spcBef>
-              <a:spcAft>
-                <a:spcPts val="0"/>
-              </a:spcAft>
-              <a:buClr>
-                <a:schemeClr val="dk1"/>
-              </a:buClr>
-              <a:buSzPct val="61111"/>
-              <a:buFont typeface="Arial"/>
-              <a:buNone/>
-            </a:pPr>
-            <a:r>
-              <a:rPr lang="ru"/>
-              <a:t>    }</a:t>
-            </a:r>
-            <a:endParaRPr/>
-          </a:p>
-          <a:p>
-            <a:pPr marL="0" lvl="0" indent="0" algn="l" rtl="0">
-              <a:spcBef>
-                <a:spcPts val="1200"/>
-              </a:spcBef>
-              <a:spcAft>
-                <a:spcPts val="1200"/>
-              </a:spcAft>
-              <a:buClr>
-                <a:schemeClr val="dk1"/>
-              </a:buClr>
-              <a:buSzPct val="61111"/>
-              <a:buFont typeface="Arial"/>
-              <a:buNone/>
-            </a:pPr>
-            <a:r>
-              <a:rPr lang="ru"/>
-              <a:t>}).start();</a:t>
-            </a:r>
-            <a:endParaRPr/>
-          </a:p>
-        </p:txBody>
-      </p:sp>
-      <p:sp>
-        <p:nvSpPr>
-          <p:cNvPr id="62" name="Google Shape;62;p14"/>
-          <p:cNvSpPr txBox="1">
-            <a:spLocks noGrp="1"/>
-          </p:cNvSpPr>
-          <p:nvPr>
-            <p:ph type="body" idx="1"/>
-          </p:nvPr>
-        </p:nvSpPr>
-        <p:spPr>
-          <a:xfrm>
-            <a:off x="5666100" y="1457550"/>
-            <a:ext cx="3166200" cy="3416400"/>
-          </a:xfrm>
-          <a:prstGeom prst="rect">
-            <a:avLst/>
-          </a:prstGeom>
-          <a:ln w="19050" cap="flat" cmpd="sng">
-            <a:solidFill>
-              <a:srgbClr val="6AA84F"/>
-            </a:solidFill>
-            <a:prstDash val="solid"/>
-            <a:round/>
-            <a:headEnd type="none" w="sm" len="sm"/>
-            <a:tailEnd type="none" w="sm" len="sm"/>
-          </a:ln>
-        </p:spPr>
-        <p:txBody>
-          <a:bodyPr spcFirstLastPara="1" wrap="square" lIns="91425" tIns="91425" rIns="91425" bIns="91425" anchor="t" anchorCtr="0">
-            <a:normAutofit/>
-          </a:bodyPr>
-          <a:lstStyle/>
-          <a:p>
-            <a:pPr marL="0" lvl="0" indent="0" algn="l" rtl="0">
-              <a:spcBef>
-                <a:spcPts val="0"/>
-              </a:spcBef>
-              <a:spcAft>
-                <a:spcPts val="0"/>
-              </a:spcAft>
-              <a:buNone/>
-            </a:pPr>
-            <a:r>
-              <a:rPr lang="ru" b="1"/>
-              <a:t>После</a:t>
-            </a:r>
-            <a:endParaRPr b="1"/>
-          </a:p>
-          <a:p>
-            <a:pPr marL="0" lvl="0" indent="0" algn="l" rtl="0">
-              <a:spcBef>
-                <a:spcPts val="1200"/>
-              </a:spcBef>
-              <a:spcAft>
-                <a:spcPts val="0"/>
-              </a:spcAft>
-              <a:buNone/>
-            </a:pPr>
-            <a:r>
-              <a:rPr lang="ru"/>
-              <a:t>new Thread(() -&gt; System.out.println("Привет, мир!")).start();</a:t>
-            </a:r>
-            <a:endParaRPr/>
-          </a:p>
-          <a:p>
-            <a:pPr marL="0" lvl="0" indent="0" algn="l" rtl="0">
-              <a:spcBef>
-                <a:spcPts val="1200"/>
-              </a:spcBef>
-              <a:spcAft>
-                <a:spcPts val="1200"/>
-              </a:spcAft>
-              <a:buNone/>
-            </a:pPr>
-            <a:endParaRPr/>
-          </a:p>
-        </p:txBody>
-      </p:sp>
-      <p:sp>
-        <p:nvSpPr>
-          <p:cNvPr id="63" name="Google Shape;63;p14"/>
-          <p:cNvSpPr txBox="1"/>
-          <p:nvPr/>
-        </p:nvSpPr>
-        <p:spPr>
-          <a:xfrm>
-            <a:off x="223250" y="701800"/>
-            <a:ext cx="8520600" cy="439800"/>
-          </a:xfrm>
-          <a:prstGeom prst="rect">
-            <a:avLst/>
-          </a:prstGeom>
-          <a:noFill/>
-          <a:ln>
-            <a:noFill/>
-          </a:ln>
-        </p:spPr>
-        <p:txBody>
-          <a:bodyPr spcFirstLastPara="1" wrap="square" lIns="91425" tIns="91425" rIns="91425" bIns="91425" anchor="t" anchorCtr="0">
-            <a:noAutofit/>
-          </a:bodyPr>
-          <a:lstStyle/>
-          <a:p>
-            <a:pPr marL="0" lvl="0" indent="0" algn="l" rtl="0">
-              <a:spcBef>
-                <a:spcPts val="0"/>
-              </a:spcBef>
-              <a:spcAft>
-                <a:spcPts val="0"/>
-              </a:spcAft>
-              <a:buNone/>
-            </a:pPr>
-            <a:r>
-              <a:rPr lang="ru">
-                <a:solidFill>
-                  <a:srgbClr val="2F2F2F"/>
-                </a:solidFill>
-              </a:rPr>
-              <a:t>Лямбды помогают создавать более лаконичный код. Они представляют собой сокращенную запись анонимного класса</a:t>
-            </a:r>
-            <a:endParaRPr sz="2000">
-              <a:solidFill>
-                <a:schemeClr val="dk2"/>
-              </a:solidFill>
-            </a:endParaRPr>
-          </a:p>
-        </p:txBody>
-      </p:sp>
-      <p:sp>
-        <p:nvSpPr>
-          <p:cNvPr id="64" name="Google Shape;64;p14"/>
-          <p:cNvSpPr/>
-          <p:nvPr/>
-        </p:nvSpPr>
-        <p:spPr>
-          <a:xfrm>
-            <a:off x="3640825" y="2713875"/>
-            <a:ext cx="1810500" cy="328500"/>
-          </a:xfrm>
-          <a:prstGeom prst="rightArrow">
-            <a:avLst>
-              <a:gd name="adj1" fmla="val 50000"/>
-              <a:gd name="adj2" fmla="val 50000"/>
-            </a:avLst>
-          </a:prstGeom>
-          <a:gradFill>
-            <a:gsLst>
-              <a:gs pos="0">
-                <a:srgbClr val="DB0000"/>
-              </a:gs>
-              <a:gs pos="28000">
-                <a:srgbClr val="FF0000"/>
-              </a:gs>
-              <a:gs pos="58000">
-                <a:srgbClr val="6AA84F"/>
-              </a:gs>
-              <a:gs pos="100000">
-                <a:srgbClr val="6AA84F"/>
-              </a:gs>
-            </a:gsLst>
-            <a:lin ang="0" scaled="0"/>
-          </a:gradFill>
-          <a:ln w="9525" cap="flat" cmpd="sng">
-            <a:solidFill>
-              <a:schemeClr val="dk2"/>
-            </a:solidFill>
-            <a:prstDash val="solid"/>
-            <a:round/>
-            <a:headEnd type="none" w="sm" len="sm"/>
-            <a:tailEnd type="none" w="sm" len="sm"/>
-          </a:ln>
-        </p:spPr>
-        <p:txBody>
-          <a:bodyPr spcFirstLastPara="1" wrap="square" lIns="91425" tIns="91425" rIns="91425" bIns="91425" anchor="ctr" anchorCtr="0">
-            <a:noAutofit/>
-          </a:bodyPr>
-          <a:lstStyle/>
-          <a:p>
-            <a:pPr marL="0" lvl="0" indent="0" algn="ctr" rtl="0">
-              <a:spcBef>
-                <a:spcPts val="0"/>
-              </a:spcBef>
-              <a:spcAft>
-                <a:spcPts val="0"/>
-              </a:spcAft>
-              <a:buNone/>
-            </a:pPr>
-            <a:endParaRPr/>
           </a:p>
         </p:txBody>
       </p:sp>

</xml_diff>